<commit_message>
Deploy website Tue Sep  6 12:34:10 PDT 2022
</commit_message>
<xml_diff>
--- a/assets/slides/fa22/03-Loops.pptx
+++ b/assets/slides/fa22/03-Loops.pptx
@@ -7415,7 +7415,19 @@
               <a:rPr lang="en-US" kern="0" dirty="0">
                 <a:latin typeface="Source Code Pro" panose="020B0509030403020204" pitchFamily="49" charset="77"/>
               </a:rPr>
-              <a:t>def max(x, y):</a:t>
+              <a:t>def </a:t>
+            </a:r>
+            <a:r>
+              <a:rPr lang="en-US" kern="0" dirty="0" err="1">
+                <a:latin typeface="Source Code Pro" panose="020B0509030403020204" pitchFamily="49" charset="77"/>
+              </a:rPr>
+              <a:t>print_max</a:t>
+            </a:r>
+            <a:r>
+              <a:rPr lang="en-US" kern="0" dirty="0">
+                <a:latin typeface="Source Code Pro" panose="020B0509030403020204" pitchFamily="49" charset="77"/>
+              </a:rPr>
+              <a:t>(x, y):</a:t>
             </a:r>
           </a:p>
           <a:p>
@@ -7439,7 +7451,7 @@
               <a:rPr lang="en-US" kern="0" dirty="0">
                 <a:latin typeface="Source Code Pro" panose="020B0509030403020204" pitchFamily="49" charset="77"/>
               </a:rPr>
-              <a:t>        return x</a:t>
+              <a:t>        print( x )</a:t>
             </a:r>
           </a:p>
           <a:p>
@@ -7463,7 +7475,7 @@
               <a:rPr lang="en-US" kern="0" dirty="0">
                 <a:latin typeface="Source Code Pro" panose="020B0509030403020204" pitchFamily="49" charset="77"/>
               </a:rPr>
-              <a:t>        return y</a:t>
+              <a:t>        print ( y )</a:t>
             </a:r>
           </a:p>
         </p:txBody>
@@ -13074,6 +13086,38 @@
             <a:endParaRPr lang="en-US" dirty="0">
               <a:latin typeface="Source Code Pro" panose="020B0509030403020204" pitchFamily="49" charset="77"/>
             </a:endParaRPr>
+          </a:p>
+        </p:txBody>
+      </p:sp>
+      <p:sp>
+        <p:nvSpPr>
+          <p:cNvPr id="4" name="TextBox 3">
+            <a:extLst>
+              <a:ext uri="{FF2B5EF4-FFF2-40B4-BE49-F238E27FC236}">
+                <a16:creationId xmlns:a16="http://schemas.microsoft.com/office/drawing/2014/main" id="{63C1F688-59BA-1550-A31B-27087037D2F6}"/>
+              </a:ext>
+            </a:extLst>
+          </p:cNvPr>
+          <p:cNvSpPr txBox="1"/>
+          <p:nvPr/>
+        </p:nvSpPr>
+        <p:spPr>
+          <a:xfrm>
+            <a:off x="8172450" y="3814763"/>
+            <a:ext cx="184731" cy="369332"/>
+          </a:xfrm>
+          <a:prstGeom prst="rect">
+            <a:avLst/>
+          </a:prstGeom>
+          <a:noFill/>
+        </p:spPr>
+        <p:txBody>
+          <a:bodyPr wrap="none" rtlCol="0">
+            <a:spAutoFit/>
+          </a:bodyPr>
+          <a:lstStyle/>
+          <a:p>
+            <a:endParaRPr lang="en-US" dirty="0"/>
           </a:p>
         </p:txBody>
       </p:sp>

</xml_diff>

<commit_message>
Deploy website Tue Sep  6 14:23:35 PDT 2022
</commit_message>
<xml_diff>
--- a/assets/slides/fa22/03-Loops.pptx
+++ b/assets/slides/fa22/03-Loops.pptx
@@ -707,14 +707,14 @@
           </a:ln>
           <a:extLst>
             <a:ext uri="{909E8E84-426E-40dd-AFC4-6F175D3DCCD1}">
-              <a14:hiddenFill xmlns:a14="http://schemas.microsoft.com/office/drawing/2010/main" xmlns="">
+              <a14:hiddenFill xmlns="" xmlns:a14="http://schemas.microsoft.com/office/drawing/2010/main">
                 <a:solidFill>
                   <a:srgbClr val="FFFFFF"/>
                 </a:solidFill>
               </a14:hiddenFill>
             </a:ext>
             <a:ext uri="{91240B29-F687-4f45-9708-019B960494DF}">
-              <a14:hiddenLine xmlns:a14="http://schemas.microsoft.com/office/drawing/2010/main" xmlns="" w="9525">
+              <a14:hiddenLine xmlns="" xmlns:a14="http://schemas.microsoft.com/office/drawing/2010/main" w="9525">
                 <a:solidFill>
                   <a:srgbClr val="000000"/>
                 </a:solidFill>
@@ -782,14 +782,14 @@
           </a:ln>
           <a:extLst>
             <a:ext uri="{909E8E84-426E-40dd-AFC4-6F175D3DCCD1}">
-              <a14:hiddenFill xmlns:a14="http://schemas.microsoft.com/office/drawing/2010/main" xmlns="">
+              <a14:hiddenFill xmlns="" xmlns:a14="http://schemas.microsoft.com/office/drawing/2010/main">
                 <a:solidFill>
                   <a:srgbClr val="FFFFFF"/>
                 </a:solidFill>
               </a14:hiddenFill>
             </a:ext>
             <a:ext uri="{FAA26D3D-D897-4be2-8F04-BA451C77F1D7}">
-              <ma14:placeholderFlag xmlns:ma14="http://schemas.microsoft.com/office/mac/drawingml/2011/main" xmlns="" val="1"/>
+              <ma14:placeholderFlag xmlns="" xmlns:ma14="http://schemas.microsoft.com/office/mac/drawingml/2011/main" val="1"/>
             </a:ext>
           </a:extLst>
         </p:spPr>
@@ -1046,14 +1046,14 @@
           <a:ln/>
           <a:extLst>
             <a:ext uri="{909E8E84-426E-40dd-AFC4-6F175D3DCCD1}">
-              <a14:hiddenFill xmlns="" xmlns:a14="http://schemas.microsoft.com/office/drawing/2010/main">
+              <a14:hiddenFill xmlns:a14="http://schemas.microsoft.com/office/drawing/2010/main" xmlns="">
                 <a:solidFill>
                   <a:srgbClr val="FFFFFF"/>
                 </a:solidFill>
               </a14:hiddenFill>
             </a:ext>
             <a:ext uri="{91240B29-F687-4f45-9708-019B960494DF}">
-              <a14:hiddenLine xmlns="" xmlns:a14="http://schemas.microsoft.com/office/drawing/2010/main" w="9525">
+              <a14:hiddenLine xmlns:a14="http://schemas.microsoft.com/office/drawing/2010/main" xmlns="" w="9525">
                 <a:solidFill>
                   <a:srgbClr val="000000"/>
                 </a:solidFill>
@@ -1221,14 +1221,14 @@
           <a:ln/>
           <a:extLst>
             <a:ext uri="{909E8E84-426E-40dd-AFC4-6F175D3DCCD1}">
-              <a14:hiddenFill xmlns="" xmlns:a14="http://schemas.microsoft.com/office/drawing/2010/main">
+              <a14:hiddenFill xmlns:a14="http://schemas.microsoft.com/office/drawing/2010/main" xmlns="">
                 <a:solidFill>
                   <a:srgbClr val="FFFFFF"/>
                 </a:solidFill>
               </a14:hiddenFill>
             </a:ext>
             <a:ext uri="{91240B29-F687-4f45-9708-019B960494DF}">
-              <a14:hiddenLine xmlns="" xmlns:a14="http://schemas.microsoft.com/office/drawing/2010/main" w="9525">
+              <a14:hiddenLine xmlns:a14="http://schemas.microsoft.com/office/drawing/2010/main" xmlns="" w="9525">
                 <a:solidFill>
                   <a:srgbClr val="000000"/>
                 </a:solidFill>
@@ -1238,7 +1238,7 @@
               </a14:hiddenLine>
             </a:ext>
             <a:ext uri="{FAA26D3D-D897-4be2-8F04-BA451C77F1D7}">
-              <ma14:placeholderFlag xmlns="" xmlns:ma14="http://schemas.microsoft.com/office/mac/drawingml/2011/main" val="1"/>
+              <ma14:placeholderFlag xmlns:ma14="http://schemas.microsoft.com/office/mac/drawingml/2011/main" xmlns="" val="1"/>
             </a:ext>
           </a:extLst>
         </p:spPr>
@@ -1519,14 +1519,14 @@
           <a:ln/>
           <a:extLst>
             <a:ext uri="{909E8E84-426E-40dd-AFC4-6F175D3DCCD1}">
-              <a14:hiddenFill xmlns:a14="http://schemas.microsoft.com/office/drawing/2010/main" xmlns="">
+              <a14:hiddenFill xmlns="" xmlns:a14="http://schemas.microsoft.com/office/drawing/2010/main">
                 <a:solidFill>
                   <a:srgbClr val="FFFFFF"/>
                 </a:solidFill>
               </a14:hiddenFill>
             </a:ext>
             <a:ext uri="{91240B29-F687-4f45-9708-019B960494DF}">
-              <a14:hiddenLine xmlns:a14="http://schemas.microsoft.com/office/drawing/2010/main" xmlns="" w="9525">
+              <a14:hiddenLine xmlns="" xmlns:a14="http://schemas.microsoft.com/office/drawing/2010/main" w="9525">
                 <a:solidFill>
                   <a:srgbClr val="000000"/>
                 </a:solidFill>
@@ -1694,14 +1694,14 @@
           <a:ln/>
           <a:extLst>
             <a:ext uri="{909E8E84-426E-40dd-AFC4-6F175D3DCCD1}">
-              <a14:hiddenFill xmlns:a14="http://schemas.microsoft.com/office/drawing/2010/main" xmlns="">
+              <a14:hiddenFill xmlns="" xmlns:a14="http://schemas.microsoft.com/office/drawing/2010/main">
                 <a:solidFill>
                   <a:srgbClr val="FFFFFF"/>
                 </a:solidFill>
               </a14:hiddenFill>
             </a:ext>
             <a:ext uri="{91240B29-F687-4f45-9708-019B960494DF}">
-              <a14:hiddenLine xmlns:a14="http://schemas.microsoft.com/office/drawing/2010/main" xmlns="" w="9525">
+              <a14:hiddenLine xmlns="" xmlns:a14="http://schemas.microsoft.com/office/drawing/2010/main" w="9525">
                 <a:solidFill>
                   <a:srgbClr val="000000"/>
                 </a:solidFill>
@@ -1711,7 +1711,7 @@
               </a14:hiddenLine>
             </a:ext>
             <a:ext uri="{FAA26D3D-D897-4be2-8F04-BA451C77F1D7}">
-              <ma14:placeholderFlag xmlns:ma14="http://schemas.microsoft.com/office/mac/drawingml/2011/main" xmlns="" val="1"/>
+              <ma14:placeholderFlag xmlns="" xmlns:ma14="http://schemas.microsoft.com/office/mac/drawingml/2011/main" val="1"/>
             </a:ext>
           </a:extLst>
         </p:spPr>
@@ -1772,14 +1772,14 @@
           <a:ln/>
           <a:extLst>
             <a:ext uri="{909E8E84-426E-40dd-AFC4-6F175D3DCCD1}">
-              <a14:hiddenFill xmlns:a14="http://schemas.microsoft.com/office/drawing/2010/main" xmlns="">
+              <a14:hiddenFill xmlns="" xmlns:a14="http://schemas.microsoft.com/office/drawing/2010/main">
                 <a:solidFill>
                   <a:srgbClr val="FFFFFF"/>
                 </a:solidFill>
               </a14:hiddenFill>
             </a:ext>
             <a:ext uri="{91240B29-F687-4f45-9708-019B960494DF}">
-              <a14:hiddenLine xmlns:a14="http://schemas.microsoft.com/office/drawing/2010/main" xmlns="" w="9525">
+              <a14:hiddenLine xmlns="" xmlns:a14="http://schemas.microsoft.com/office/drawing/2010/main" w="9525">
                 <a:solidFill>
                   <a:srgbClr val="000000"/>
                 </a:solidFill>
@@ -1947,14 +1947,14 @@
           <a:ln/>
           <a:extLst>
             <a:ext uri="{909E8E84-426E-40dd-AFC4-6F175D3DCCD1}">
-              <a14:hiddenFill xmlns:a14="http://schemas.microsoft.com/office/drawing/2010/main" xmlns="">
+              <a14:hiddenFill xmlns="" xmlns:a14="http://schemas.microsoft.com/office/drawing/2010/main">
                 <a:solidFill>
                   <a:srgbClr val="FFFFFF"/>
                 </a:solidFill>
               </a14:hiddenFill>
             </a:ext>
             <a:ext uri="{91240B29-F687-4f45-9708-019B960494DF}">
-              <a14:hiddenLine xmlns:a14="http://schemas.microsoft.com/office/drawing/2010/main" xmlns="" w="9525">
+              <a14:hiddenLine xmlns="" xmlns:a14="http://schemas.microsoft.com/office/drawing/2010/main" w="9525">
                 <a:solidFill>
                   <a:srgbClr val="000000"/>
                 </a:solidFill>
@@ -1964,7 +1964,7 @@
               </a14:hiddenLine>
             </a:ext>
             <a:ext uri="{FAA26D3D-D897-4be2-8F04-BA451C77F1D7}">
-              <ma14:placeholderFlag xmlns:ma14="http://schemas.microsoft.com/office/mac/drawingml/2011/main" xmlns="" val="1"/>
+              <ma14:placeholderFlag xmlns="" xmlns:ma14="http://schemas.microsoft.com/office/mac/drawingml/2011/main" val="1"/>
             </a:ext>
           </a:extLst>
         </p:spPr>
@@ -2115,14 +2115,14 @@
           <a:ln/>
           <a:extLst>
             <a:ext uri="{909E8E84-426E-40dd-AFC4-6F175D3DCCD1}">
-              <a14:hiddenFill xmlns:a14="http://schemas.microsoft.com/office/drawing/2010/main" xmlns="">
+              <a14:hiddenFill xmlns="" xmlns:a14="http://schemas.microsoft.com/office/drawing/2010/main">
                 <a:solidFill>
                   <a:srgbClr val="FFFFFF"/>
                 </a:solidFill>
               </a14:hiddenFill>
             </a:ext>
             <a:ext uri="{91240B29-F687-4f45-9708-019B960494DF}">
-              <a14:hiddenLine xmlns:a14="http://schemas.microsoft.com/office/drawing/2010/main" xmlns="" w="9525">
+              <a14:hiddenLine xmlns="" xmlns:a14="http://schemas.microsoft.com/office/drawing/2010/main" w="9525">
                 <a:solidFill>
                   <a:srgbClr val="000000"/>
                 </a:solidFill>
@@ -2290,14 +2290,14 @@
           <a:ln/>
           <a:extLst>
             <a:ext uri="{909E8E84-426E-40dd-AFC4-6F175D3DCCD1}">
-              <a14:hiddenFill xmlns:a14="http://schemas.microsoft.com/office/drawing/2010/main" xmlns="">
+              <a14:hiddenFill xmlns="" xmlns:a14="http://schemas.microsoft.com/office/drawing/2010/main">
                 <a:solidFill>
                   <a:srgbClr val="FFFFFF"/>
                 </a:solidFill>
               </a14:hiddenFill>
             </a:ext>
             <a:ext uri="{91240B29-F687-4f45-9708-019B960494DF}">
-              <a14:hiddenLine xmlns:a14="http://schemas.microsoft.com/office/drawing/2010/main" xmlns="" w="9525">
+              <a14:hiddenLine xmlns="" xmlns:a14="http://schemas.microsoft.com/office/drawing/2010/main" w="9525">
                 <a:solidFill>
                   <a:srgbClr val="000000"/>
                 </a:solidFill>
@@ -2307,7 +2307,7 @@
               </a14:hiddenLine>
             </a:ext>
             <a:ext uri="{FAA26D3D-D897-4be2-8F04-BA451C77F1D7}">
-              <ma14:placeholderFlag xmlns:ma14="http://schemas.microsoft.com/office/mac/drawingml/2011/main" xmlns="" val="1"/>
+              <ma14:placeholderFlag xmlns="" xmlns:ma14="http://schemas.microsoft.com/office/mac/drawingml/2011/main" val="1"/>
             </a:ext>
           </a:extLst>
         </p:spPr>
@@ -2611,14 +2611,14 @@
           <a:ln/>
           <a:extLst>
             <a:ext uri="{909E8E84-426E-40dd-AFC4-6F175D3DCCD1}">
-              <a14:hiddenFill xmlns:a14="http://schemas.microsoft.com/office/drawing/2010/main" xmlns="">
+              <a14:hiddenFill xmlns="" xmlns:a14="http://schemas.microsoft.com/office/drawing/2010/main">
                 <a:solidFill>
                   <a:srgbClr val="FFFFFF"/>
                 </a:solidFill>
               </a14:hiddenFill>
             </a:ext>
             <a:ext uri="{91240B29-F687-4f45-9708-019B960494DF}">
-              <a14:hiddenLine xmlns:a14="http://schemas.microsoft.com/office/drawing/2010/main" xmlns="" w="9525">
+              <a14:hiddenLine xmlns="" xmlns:a14="http://schemas.microsoft.com/office/drawing/2010/main" w="9525">
                 <a:solidFill>
                   <a:srgbClr val="000000"/>
                 </a:solidFill>
@@ -2786,14 +2786,14 @@
           <a:ln/>
           <a:extLst>
             <a:ext uri="{909E8E84-426E-40dd-AFC4-6F175D3DCCD1}">
-              <a14:hiddenFill xmlns:a14="http://schemas.microsoft.com/office/drawing/2010/main" xmlns="">
+              <a14:hiddenFill xmlns="" xmlns:a14="http://schemas.microsoft.com/office/drawing/2010/main">
                 <a:solidFill>
                   <a:srgbClr val="FFFFFF"/>
                 </a:solidFill>
               </a14:hiddenFill>
             </a:ext>
             <a:ext uri="{91240B29-F687-4f45-9708-019B960494DF}">
-              <a14:hiddenLine xmlns:a14="http://schemas.microsoft.com/office/drawing/2010/main" xmlns="" w="9525">
+              <a14:hiddenLine xmlns="" xmlns:a14="http://schemas.microsoft.com/office/drawing/2010/main" w="9525">
                 <a:solidFill>
                   <a:srgbClr val="000000"/>
                 </a:solidFill>
@@ -2803,7 +2803,7 @@
               </a14:hiddenLine>
             </a:ext>
             <a:ext uri="{FAA26D3D-D897-4be2-8F04-BA451C77F1D7}">
-              <ma14:placeholderFlag xmlns:ma14="http://schemas.microsoft.com/office/mac/drawingml/2011/main" xmlns="" val="1"/>
+              <ma14:placeholderFlag xmlns="" xmlns:ma14="http://schemas.microsoft.com/office/mac/drawingml/2011/main" val="1"/>
             </a:ext>
           </a:extLst>
         </p:spPr>
@@ -2876,7 +2876,7 @@
           </a:ln>
           <a:extLst>
             <a:ext uri="{909E8E84-426E-40dd-AFC4-6F175D3DCCD1}">
-              <a14:hiddenFill xmlns:a14="http://schemas.microsoft.com/office/drawing/2010/main" xmlns="">
+              <a14:hiddenFill xmlns="" xmlns:a14="http://schemas.microsoft.com/office/drawing/2010/main">
                 <a:noFill/>
               </a14:hiddenFill>
             </a:ext>
@@ -2917,14 +2917,14 @@
           </a:ln>
           <a:extLst>
             <a:ext uri="{909E8E84-426E-40dd-AFC4-6F175D3DCCD1}">
-              <a14:hiddenFill xmlns:a14="http://schemas.microsoft.com/office/drawing/2010/main" xmlns="">
+              <a14:hiddenFill xmlns="" xmlns:a14="http://schemas.microsoft.com/office/drawing/2010/main">
                 <a:solidFill>
                   <a:srgbClr val="FFFFFF"/>
                 </a:solidFill>
               </a14:hiddenFill>
             </a:ext>
             <a:ext uri="{91240B29-F687-4f45-9708-019B960494DF}">
-              <a14:hiddenLine xmlns:a14="http://schemas.microsoft.com/office/drawing/2010/main" xmlns="" w="9525">
+              <a14:hiddenLine xmlns="" xmlns:a14="http://schemas.microsoft.com/office/drawing/2010/main" w="9525">
                 <a:solidFill>
                   <a:srgbClr val="000000"/>
                 </a:solidFill>
@@ -3070,14 +3070,14 @@
           </a:ln>
           <a:extLst>
             <a:ext uri="{909E8E84-426E-40dd-AFC4-6F175D3DCCD1}">
-              <a14:hiddenFill xmlns:a14="http://schemas.microsoft.com/office/drawing/2010/main" xmlns="">
+              <a14:hiddenFill xmlns="" xmlns:a14="http://schemas.microsoft.com/office/drawing/2010/main">
                 <a:solidFill>
                   <a:srgbClr val="FFFFFF"/>
                 </a:solidFill>
               </a14:hiddenFill>
             </a:ext>
             <a:ext uri="{91240B29-F687-4f45-9708-019B960494DF}">
-              <a14:hiddenLine xmlns:a14="http://schemas.microsoft.com/office/drawing/2010/main" xmlns="" w="9525">
+              <a14:hiddenLine xmlns="" xmlns:a14="http://schemas.microsoft.com/office/drawing/2010/main" w="9525">
                 <a:solidFill>
                   <a:srgbClr val="000000"/>
                 </a:solidFill>
@@ -3087,7 +3087,7 @@
               </a14:hiddenLine>
             </a:ext>
             <a:ext uri="{FAA26D3D-D897-4be2-8F04-BA451C77F1D7}">
-              <ma14:placeholderFlag xmlns:ma14="http://schemas.microsoft.com/office/mac/drawingml/2011/main" xmlns="" val="1"/>
+              <ma14:placeholderFlag xmlns="" xmlns:ma14="http://schemas.microsoft.com/office/mac/drawingml/2011/main" val="1"/>
             </a:ext>
           </a:extLst>
         </p:spPr>
@@ -3425,14 +3425,14 @@
           </a:ln>
           <a:extLst>
             <a:ext uri="{909E8E84-426E-40dd-AFC4-6F175D3DCCD1}">
-              <a14:hiddenFill xmlns:a14="http://schemas.microsoft.com/office/drawing/2010/main" xmlns="">
+              <a14:hiddenFill xmlns="" xmlns:a14="http://schemas.microsoft.com/office/drawing/2010/main">
                 <a:solidFill>
                   <a:srgbClr val="FFFFFF"/>
                 </a:solidFill>
               </a14:hiddenFill>
             </a:ext>
             <a:ext uri="{91240B29-F687-4f45-9708-019B960494DF}">
-              <a14:hiddenLine xmlns:a14="http://schemas.microsoft.com/office/drawing/2010/main" xmlns="" w="9525">
+              <a14:hiddenLine xmlns="" xmlns:a14="http://schemas.microsoft.com/office/drawing/2010/main" w="9525">
                 <a:solidFill>
                   <a:srgbClr val="000000"/>
                 </a:solidFill>
@@ -3442,7 +3442,7 @@
               </a14:hiddenLine>
             </a:ext>
             <a:ext uri="{FAA26D3D-D897-4be2-8F04-BA451C77F1D7}">
-              <ma14:placeholderFlag xmlns:ma14="http://schemas.microsoft.com/office/mac/drawingml/2011/main" xmlns="" val="1"/>
+              <ma14:placeholderFlag xmlns="" xmlns:ma14="http://schemas.microsoft.com/office/mac/drawingml/2011/main" val="1"/>
             </a:ext>
           </a:extLst>
         </p:spPr>
@@ -5838,14 +5838,14 @@
           </a:ln>
           <a:extLst>
             <a:ext uri="{909E8E84-426E-40dd-AFC4-6F175D3DCCD1}">
-              <a14:hiddenFill xmlns:a14="http://schemas.microsoft.com/office/drawing/2010/main" xmlns="">
+              <a14:hiddenFill xmlns="" xmlns:a14="http://schemas.microsoft.com/office/drawing/2010/main">
                 <a:solidFill>
                   <a:srgbClr val="FFFFFF"/>
                 </a:solidFill>
               </a14:hiddenFill>
             </a:ext>
             <a:ext uri="{91240B29-F687-4f45-9708-019B960494DF}">
-              <a14:hiddenLine xmlns:a14="http://schemas.microsoft.com/office/drawing/2010/main" xmlns="" w="9525">
+              <a14:hiddenLine xmlns="" xmlns:a14="http://schemas.microsoft.com/office/drawing/2010/main" w="9525">
                 <a:solidFill>
                   <a:srgbClr val="000000"/>
                 </a:solidFill>
@@ -5855,7 +5855,7 @@
               </a14:hiddenLine>
             </a:ext>
             <a:ext uri="{FAA26D3D-D897-4be2-8F04-BA451C77F1D7}">
-              <ma14:placeholderFlag xmlns:ma14="http://schemas.microsoft.com/office/mac/drawingml/2011/main" xmlns="" val="1"/>
+              <ma14:placeholderFlag xmlns="" xmlns:ma14="http://schemas.microsoft.com/office/mac/drawingml/2011/main" val="1"/>
             </a:ext>
           </a:extLst>
         </p:spPr>
@@ -5899,14 +5899,14 @@
           </a:ln>
           <a:extLst>
             <a:ext uri="{909E8E84-426E-40dd-AFC4-6F175D3DCCD1}">
-              <a14:hiddenFill xmlns:a14="http://schemas.microsoft.com/office/drawing/2010/main" xmlns="">
+              <a14:hiddenFill xmlns="" xmlns:a14="http://schemas.microsoft.com/office/drawing/2010/main">
                 <a:solidFill>
                   <a:srgbClr val="FFFFFF"/>
                 </a:solidFill>
               </a14:hiddenFill>
             </a:ext>
             <a:ext uri="{91240B29-F687-4f45-9708-019B960494DF}">
-              <a14:hiddenLine xmlns:a14="http://schemas.microsoft.com/office/drawing/2010/main" xmlns="" w="9525">
+              <a14:hiddenLine xmlns="" xmlns:a14="http://schemas.microsoft.com/office/drawing/2010/main" w="9525">
                 <a:solidFill>
                   <a:srgbClr val="000000"/>
                 </a:solidFill>
@@ -5916,7 +5916,7 @@
               </a14:hiddenLine>
             </a:ext>
             <a:ext uri="{FAA26D3D-D897-4be2-8F04-BA451C77F1D7}">
-              <ma14:placeholderFlag xmlns:ma14="http://schemas.microsoft.com/office/mac/drawingml/2011/main" xmlns="" val="1"/>
+              <ma14:placeholderFlag xmlns="" xmlns:ma14="http://schemas.microsoft.com/office/mac/drawingml/2011/main" val="1"/>
             </a:ext>
           </a:extLst>
         </p:spPr>
@@ -6021,7 +6021,7 @@
           </a:ln>
           <a:extLst>
             <a:ext uri="{909E8E84-426E-40dd-AFC4-6F175D3DCCD1}">
-              <a14:hiddenFill xmlns:a14="http://schemas.microsoft.com/office/drawing/2010/main" xmlns="">
+              <a14:hiddenFill xmlns="" xmlns:a14="http://schemas.microsoft.com/office/drawing/2010/main">
                 <a:noFill/>
               </a14:hiddenFill>
             </a:ext>
@@ -6062,14 +6062,14 @@
           </a:ln>
           <a:extLst>
             <a:ext uri="{909E8E84-426E-40dd-AFC4-6F175D3DCCD1}">
-              <a14:hiddenFill xmlns:a14="http://schemas.microsoft.com/office/drawing/2010/main" xmlns="">
+              <a14:hiddenFill xmlns="" xmlns:a14="http://schemas.microsoft.com/office/drawing/2010/main">
                 <a:solidFill>
                   <a:srgbClr val="FFFFFF"/>
                 </a:solidFill>
               </a14:hiddenFill>
             </a:ext>
             <a:ext uri="{91240B29-F687-4f45-9708-019B960494DF}">
-              <a14:hiddenLine xmlns:a14="http://schemas.microsoft.com/office/drawing/2010/main" xmlns="" w="9525">
+              <a14:hiddenLine xmlns="" xmlns:a14="http://schemas.microsoft.com/office/drawing/2010/main" w="9525">
                 <a:solidFill>
                   <a:srgbClr val="000000"/>
                 </a:solidFill>
@@ -6109,14 +6109,14 @@
           </a:ln>
           <a:extLst>
             <a:ext uri="{909E8E84-426E-40dd-AFC4-6F175D3DCCD1}">
-              <a14:hiddenFill xmlns:a14="http://schemas.microsoft.com/office/drawing/2010/main" xmlns="">
+              <a14:hiddenFill xmlns="" xmlns:a14="http://schemas.microsoft.com/office/drawing/2010/main">
                 <a:solidFill>
                   <a:srgbClr val="FFFFFF"/>
                 </a:solidFill>
               </a14:hiddenFill>
             </a:ext>
             <a:ext uri="{91240B29-F687-4f45-9708-019B960494DF}">
-              <a14:hiddenLine xmlns:a14="http://schemas.microsoft.com/office/drawing/2010/main" xmlns="" w="9525">
+              <a14:hiddenLine xmlns="" xmlns:a14="http://schemas.microsoft.com/office/drawing/2010/main" w="9525">
                 <a:solidFill>
                   <a:srgbClr val="000000"/>
                 </a:solidFill>
@@ -6126,7 +6126,7 @@
               </a14:hiddenLine>
             </a:ext>
             <a:ext uri="{FAA26D3D-D897-4be2-8F04-BA451C77F1D7}">
-              <ma14:placeholderFlag xmlns:ma14="http://schemas.microsoft.com/office/mac/drawingml/2011/main" xmlns="" val="1"/>
+              <ma14:placeholderFlag xmlns="" xmlns:ma14="http://schemas.microsoft.com/office/mac/drawingml/2011/main" val="1"/>
             </a:ext>
           </a:extLst>
         </p:spPr>
@@ -7195,14 +7195,14 @@
           </a:ln>
           <a:extLst>
             <a:ext uri="{909E8E84-426E-40dd-AFC4-6F175D3DCCD1}">
-              <a14:hiddenFill xmlns:a14="http://schemas.microsoft.com/office/drawing/2010/main" xmlns="">
+              <a14:hiddenFill xmlns="" xmlns:a14="http://schemas.microsoft.com/office/drawing/2010/main">
                 <a:solidFill>
                   <a:srgbClr val="FFFFFF"/>
                 </a:solidFill>
               </a14:hiddenFill>
             </a:ext>
             <a:ext uri="{91240B29-F687-4f45-9708-019B960494DF}">
-              <a14:hiddenLine xmlns:a14="http://schemas.microsoft.com/office/drawing/2010/main" xmlns="" w="9525">
+              <a14:hiddenLine xmlns="" xmlns:a14="http://schemas.microsoft.com/office/drawing/2010/main" w="9525">
                 <a:solidFill>
                   <a:srgbClr val="000000"/>
                 </a:solidFill>
@@ -7212,7 +7212,7 @@
               </a14:hiddenLine>
             </a:ext>
             <a:ext uri="{FAA26D3D-D897-4be2-8F04-BA451C77F1D7}">
-              <ma14:placeholderFlag xmlns:ma14="http://schemas.microsoft.com/office/mac/drawingml/2011/main" xmlns="" val="1"/>
+              <ma14:placeholderFlag xmlns="" xmlns:ma14="http://schemas.microsoft.com/office/mac/drawingml/2011/main" val="1"/>
             </a:ext>
           </a:extLst>
         </p:spPr>
@@ -11742,7 +11742,7 @@
             <a:pPr lvl="1"/>
             <a:r>
               <a:rPr lang="en-US" dirty="0"/>
-              <a:t>lists (next week!)</a:t>
+              <a:t>lists (next!)</a:t>
             </a:r>
           </a:p>
           <a:p>

</xml_diff>